<commit_message>
Moved Some Things Around
</commit_message>
<xml_diff>
--- a/Presentation/PowerShell Prescriptions.pptx
+++ b/Presentation/PowerShell Prescriptions.pptx
@@ -145,12 +145,20 @@
 </p:presentation>
 </file>
 
+<file path=ppt/revisionInfo.xml><?xml version="1.0" encoding="utf-8"?>
+<p1510:revInfo xmlns:a="http://schemas.openxmlformats.org/drawingml/2006/main" xmlns:r="http://schemas.openxmlformats.org/officeDocument/2006/relationships" xmlns:p1510="http://schemas.microsoft.com/office/powerpoint/2015/10/main">
+  <p1510:revLst>
+    <p1510:client id="{8F3EFE7D-007B-493F-80BB-DA8B882A6425}" v="1" dt="2025-10-15T06:39:07.832"/>
+  </p1510:revLst>
+</p1510:revInfo>
+</file>
+
 <file path=ppt/changesInfos/changesInfo1.xml><?xml version="1.0" encoding="utf-8"?>
 <pc:chgInfo xmlns:a="http://schemas.openxmlformats.org/drawingml/2006/main" xmlns:r="http://schemas.openxmlformats.org/officeDocument/2006/relationships" xmlns:ac="http://schemas.microsoft.com/office/drawing/2013/main/command" xmlns:pc="http://schemas.microsoft.com/office/powerpoint/2013/main/command">
   <pc:docChgLst>
     <pc:chgData name="Chris Thompson" userId="fb90e2fc-8291-4051-aad4-9211e4f437d7" providerId="ADAL" clId="{EA0E9A8A-49EE-42EA-BAAF-C592942E46A4}"/>
     <pc:docChg chg="undo redo custSel modSld">
-      <pc:chgData name="Chris Thompson" userId="fb90e2fc-8291-4051-aad4-9211e4f437d7" providerId="ADAL" clId="{EA0E9A8A-49EE-42EA-BAAF-C592942E46A4}" dt="2025-10-15T05:38:50.634" v="20" actId="404"/>
+      <pc:chgData name="Chris Thompson" userId="fb90e2fc-8291-4051-aad4-9211e4f437d7" providerId="ADAL" clId="{EA0E9A8A-49EE-42EA-BAAF-C592942E46A4}" dt="2025-10-15T06:39:07.910" v="22" actId="27636"/>
       <pc:docMkLst>
         <pc:docMk/>
       </pc:docMkLst>
@@ -208,6 +216,21 @@
         </pc:spChg>
       </pc:sldChg>
       <pc:sldChg chg="modSp mod">
+        <pc:chgData name="Chris Thompson" userId="fb90e2fc-8291-4051-aad4-9211e4f437d7" providerId="ADAL" clId="{EA0E9A8A-49EE-42EA-BAAF-C592942E46A4}" dt="2025-10-15T06:39:07.910" v="22" actId="27636"/>
+        <pc:sldMkLst>
+          <pc:docMk/>
+          <pc:sldMk cId="0" sldId="266"/>
+        </pc:sldMkLst>
+        <pc:spChg chg="mod">
+          <ac:chgData name="Chris Thompson" userId="fb90e2fc-8291-4051-aad4-9211e4f437d7" providerId="ADAL" clId="{EA0E9A8A-49EE-42EA-BAAF-C592942E46A4}" dt="2025-10-15T06:39:07.910" v="22" actId="27636"/>
+          <ac:spMkLst>
+            <pc:docMk/>
+            <pc:sldMk cId="0" sldId="266"/>
+            <ac:spMk id="3" creationId="{00000000-0000-0000-0000-000000000000}"/>
+          </ac:spMkLst>
+        </pc:spChg>
+      </pc:sldChg>
+      <pc:sldChg chg="modSp mod">
         <pc:chgData name="Chris Thompson" userId="fb90e2fc-8291-4051-aad4-9211e4f437d7" providerId="ADAL" clId="{EA0E9A8A-49EE-42EA-BAAF-C592942E46A4}" dt="2025-10-15T05:38:10.883" v="17" actId="404"/>
         <pc:sldMkLst>
           <pc:docMk/>
@@ -231,13 +254,13 @@
         </pc:spChg>
       </pc:sldChg>
       <pc:sldChg chg="modSp mod">
-        <pc:chgData name="Chris Thompson" userId="fb90e2fc-8291-4051-aad4-9211e4f437d7" providerId="ADAL" clId="{EA0E9A8A-49EE-42EA-BAAF-C592942E46A4}" dt="2025-10-15T05:38:50.634" v="20" actId="404"/>
+        <pc:chgData name="Chris Thompson" userId="fb90e2fc-8291-4051-aad4-9211e4f437d7" providerId="ADAL" clId="{EA0E9A8A-49EE-42EA-BAAF-C592942E46A4}" dt="2025-10-15T06:39:07.832" v="21"/>
         <pc:sldMkLst>
           <pc:docMk/>
           <pc:sldMk cId="0" sldId="276"/>
         </pc:sldMkLst>
         <pc:spChg chg="mod">
-          <ac:chgData name="Chris Thompson" userId="fb90e2fc-8291-4051-aad4-9211e4f437d7" providerId="ADAL" clId="{EA0E9A8A-49EE-42EA-BAAF-C592942E46A4}" dt="2025-10-15T05:38:50.634" v="20" actId="404"/>
+          <ac:chgData name="Chris Thompson" userId="fb90e2fc-8291-4051-aad4-9211e4f437d7" providerId="ADAL" clId="{EA0E9A8A-49EE-42EA-BAAF-C592942E46A4}" dt="2025-10-15T06:39:07.832" v="21"/>
           <ac:spMkLst>
             <pc:docMk/>
             <pc:sldMk cId="0" sldId="276"/>
@@ -5166,7 +5189,9 @@
         </p:nvSpPr>
         <p:spPr/>
         <p:txBody>
-          <a:bodyPr/>
+          <a:bodyPr>
+            <a:normAutofit lnSpcReduction="10000"/>
+          </a:bodyPr>
           <a:lstStyle/>
           <a:p>
             <a:pPr lvl="0"/>
@@ -6023,13 +6048,7 @@
               <a:rPr>
                 <a:hlinkClick r:id="rId4"/>
               </a:rPr>
-              <a:t>Emacs </a:t>
-            </a:r>
-            <a:r>
-              <a:rPr>
-                <a:hlinkClick r:id="rId4"/>
-              </a:rPr>
-              <a:t>org-babel</a:t>
+              <a:t>Emacs org-babel</a:t>
             </a:r>
           </a:p>
           <a:p>
@@ -6457,7 +6476,7 @@
               <a:buNone/>
             </a:pPr>
             <a:r>
-              <a:rPr sz="1400">
+              <a:rPr lang="en-CA" sz="1400" dirty="0">
                 <a:solidFill>
                   <a:srgbClr val="06287E"/>
                 </a:solidFill>
@@ -6466,37 +6485,55 @@
               <a:t>Import-Module</a:t>
             </a:r>
             <a:r>
-              <a:rPr sz="1400">
+              <a:rPr lang="en-CA" sz="1400" dirty="0">
                 <a:latin typeface="Cascadia Code"/>
               </a:rPr>
               <a:t> </a:t>
             </a:r>
             <a:r>
-              <a:rPr sz="1400">
+              <a:rPr lang="en-CA" sz="1400" dirty="0">
                 <a:solidFill>
                   <a:srgbClr val="666666"/>
                 </a:solidFill>
                 <a:latin typeface="Cascadia Code"/>
               </a:rPr>
-              <a:t>.</a:t>
-            </a:r>
-            <a:r>
-              <a:rPr sz="1400">
-                <a:latin typeface="Cascadia Code"/>
-              </a:rPr>
-              <a:t>\Modules\PolyglotNotebook</a:t>
+              <a:t>..</a:t>
+            </a:r>
+            <a:r>
+              <a:rPr lang="en-CA" sz="1400" dirty="0">
+                <a:latin typeface="Cascadia Code"/>
+              </a:rPr>
+              <a:t>\Modules\</a:t>
+            </a:r>
+            <a:r>
+              <a:rPr lang="en-CA" sz="1400" dirty="0" err="1">
+                <a:latin typeface="Cascadia Code"/>
+              </a:rPr>
+              <a:t>PolyglotNotebook</a:t>
             </a:r>
             <a:br>
-              <a:rPr sz="1400"/>
+              <a:rPr lang="en-CA" sz="1400" dirty="0"/>
             </a:br>
             <a:r>
-              <a:rPr sz="1400">
-                <a:latin typeface="Cascadia Code"/>
-              </a:rPr>
-              <a:t>Import-PolyglotNotebook </a:t>
-            </a:r>
-            <a:r>
-              <a:rPr sz="1400">
+              <a:rPr lang="en-CA" sz="1400" dirty="0">
+                <a:latin typeface="Cascadia Code"/>
+              </a:rPr>
+              <a:t>Import-</a:t>
+            </a:r>
+            <a:r>
+              <a:rPr lang="en-CA" sz="1400" dirty="0" err="1">
+                <a:latin typeface="Cascadia Code"/>
+              </a:rPr>
+              <a:t>PolyglotNotebook</a:t>
+            </a:r>
+            <a:r>
+              <a:rPr lang="en-CA" sz="1400" dirty="0">
+                <a:latin typeface="Cascadia Code"/>
+              </a:rPr>
+              <a:t> </a:t>
+            </a:r>
+            <a:r>
+              <a:rPr lang="en-CA" sz="1400" dirty="0">
                 <a:solidFill>
                   <a:srgbClr val="666666"/>
                 </a:solidFill>
@@ -6505,13 +6542,13 @@
               <a:t>.</a:t>
             </a:r>
             <a:r>
-              <a:rPr sz="1400">
+              <a:rPr lang="en-CA" sz="1400" dirty="0">
                 <a:latin typeface="Cascadia Code"/>
               </a:rPr>
               <a:t>\Notebook</a:t>
             </a:r>
             <a:r>
-              <a:rPr sz="1400">
+              <a:rPr lang="en-CA" sz="1400" dirty="0">
                 <a:solidFill>
                   <a:srgbClr val="666666"/>
                 </a:solidFill>
@@ -6520,7 +6557,7 @@
               <a:t>.</a:t>
             </a:r>
             <a:r>
-              <a:rPr sz="1400">
+              <a:rPr lang="en-CA" sz="1400" dirty="0">
                 <a:solidFill>
                   <a:srgbClr val="06287E"/>
                 </a:solidFill>
@@ -6529,13 +6566,13 @@
               <a:t>dib</a:t>
             </a:r>
             <a:r>
-              <a:rPr sz="1400">
+              <a:rPr lang="en-CA" sz="1400" dirty="0">
                 <a:latin typeface="Cascadia Code"/>
               </a:rPr>
               <a:t> </a:t>
             </a:r>
             <a:r>
-              <a:rPr sz="1400">
+              <a:rPr lang="en-CA" sz="1400" dirty="0">
                 <a:solidFill>
                   <a:srgbClr val="666666"/>
                 </a:solidFill>
@@ -6544,16 +6581,28 @@
               <a:t>|</a:t>
             </a:r>
             <a:br>
-              <a:rPr sz="1400"/>
+              <a:rPr lang="en-CA" sz="1400" dirty="0"/>
             </a:br>
             <a:r>
-              <a:rPr sz="1400">
-                <a:latin typeface="Cascadia Code"/>
-              </a:rPr>
-              <a:t>Convert-PolyglotNotebookToMarkdown </a:t>
-            </a:r>
-            <a:r>
-              <a:rPr sz="1400">
+              <a:rPr lang="en-CA" sz="1400" dirty="0">
+                <a:latin typeface="Cascadia Code"/>
+              </a:rPr>
+              <a:t>Convert-</a:t>
+            </a:r>
+            <a:r>
+              <a:rPr lang="en-CA" sz="1400" dirty="0" err="1">
+                <a:latin typeface="Cascadia Code"/>
+              </a:rPr>
+              <a:t>PolyglotNotebookToMarkdown</a:t>
+            </a:r>
+            <a:r>
+              <a:rPr lang="en-CA" sz="1400" dirty="0">
+                <a:latin typeface="Cascadia Code"/>
+              </a:rPr>
+              <a:t> </a:t>
+            </a:r>
+            <a:r>
+              <a:rPr lang="en-CA" sz="1400" dirty="0">
                 <a:solidFill>
                   <a:srgbClr val="666666"/>
                 </a:solidFill>
@@ -6562,10 +6611,10 @@
               <a:t>|</a:t>
             </a:r>
             <a:br>
-              <a:rPr sz="1400"/>
+              <a:rPr lang="en-CA" sz="1400" dirty="0"/>
             </a:br>
             <a:r>
-              <a:rPr sz="1400">
+              <a:rPr lang="en-CA" sz="1400" dirty="0">
                 <a:solidFill>
                   <a:srgbClr val="06287E"/>
                 </a:solidFill>
@@ -6574,13 +6623,13 @@
               <a:t>Set-Content</a:t>
             </a:r>
             <a:r>
-              <a:rPr sz="1400">
+              <a:rPr lang="en-CA" sz="1400" dirty="0">
                 <a:latin typeface="Cascadia Code"/>
               </a:rPr>
               <a:t> </a:t>
             </a:r>
             <a:r>
-              <a:rPr sz="1400">
+              <a:rPr lang="en-CA" sz="1400" dirty="0">
                 <a:solidFill>
                   <a:srgbClr val="666666"/>
                 </a:solidFill>
@@ -6589,13 +6638,13 @@
               <a:t>-</a:t>
             </a:r>
             <a:r>
-              <a:rPr sz="1400">
+              <a:rPr lang="en-CA" sz="1400" dirty="0">
                 <a:latin typeface="Cascadia Code"/>
               </a:rPr>
               <a:t>Path </a:t>
             </a:r>
             <a:r>
-              <a:rPr sz="1400">
+              <a:rPr lang="en-CA" sz="1400" dirty="0">
                 <a:solidFill>
                   <a:srgbClr val="666666"/>
                 </a:solidFill>
@@ -6604,13 +6653,13 @@
               <a:t>.</a:t>
             </a:r>
             <a:r>
-              <a:rPr sz="1400">
-                <a:latin typeface="Cascadia Code"/>
-              </a:rPr>
-              <a:t>\README</a:t>
-            </a:r>
-            <a:r>
-              <a:rPr sz="1400">
+              <a:rPr lang="en-CA" sz="1400" dirty="0">
+                <a:latin typeface="Cascadia Code"/>
+              </a:rPr>
+              <a:t>\Presentation</a:t>
+            </a:r>
+            <a:r>
+              <a:rPr lang="en-CA" sz="1400" dirty="0">
                 <a:solidFill>
                   <a:srgbClr val="666666"/>
                 </a:solidFill>
@@ -6619,7 +6668,7 @@
               <a:t>.</a:t>
             </a:r>
             <a:r>
-              <a:rPr sz="1400">
+              <a:rPr lang="en-CA" sz="1400" dirty="0">
                 <a:solidFill>
                   <a:srgbClr val="06287E"/>
                 </a:solidFill>
@@ -6627,20 +6676,19 @@
               </a:rPr>
               <a:t>md</a:t>
             </a:r>
-            <a:br>
-              <a:rPr sz="1400"/>
-            </a:br>
-            <a:br>
-              <a:rPr sz="1400"/>
-            </a:br>
-            <a:r>
-              <a:rPr sz="1400">
+          </a:p>
+          <a:p>
+            <a:pPr lvl="0" indent="0">
+              <a:buNone/>
+            </a:pPr>
+            <a:r>
+              <a:rPr lang="en-CA" sz="1400" dirty="0">
                 <a:latin typeface="Cascadia Code"/>
               </a:rPr>
               <a:t>pandoc</a:t>
             </a:r>
             <a:r>
-              <a:rPr sz="1400">
+              <a:rPr lang="en-CA" sz="1400" dirty="0">
                 <a:solidFill>
                   <a:srgbClr val="666666"/>
                 </a:solidFill>
@@ -6649,7 +6697,7 @@
               <a:t>.</a:t>
             </a:r>
             <a:r>
-              <a:rPr sz="1400">
+              <a:rPr lang="en-CA" sz="1400" dirty="0">
                 <a:solidFill>
                   <a:srgbClr val="06287E"/>
                 </a:solidFill>
@@ -6658,13 +6706,13 @@
               <a:t>exe</a:t>
             </a:r>
             <a:r>
-              <a:rPr sz="1400">
+              <a:rPr lang="en-CA" sz="1400" dirty="0">
                 <a:latin typeface="Cascadia Code"/>
               </a:rPr>
               <a:t> </a:t>
             </a:r>
             <a:r>
-              <a:rPr sz="1400">
+              <a:rPr lang="en-CA" sz="1400" dirty="0">
                 <a:solidFill>
                   <a:srgbClr val="666666"/>
                 </a:solidFill>
@@ -6673,34 +6721,34 @@
               <a:t>@(</a:t>
             </a:r>
             <a:br>
-              <a:rPr sz="1400"/>
+              <a:rPr lang="en-CA" sz="1400" dirty="0"/>
             </a:br>
             <a:r>
-              <a:rPr sz="1400">
+              <a:rPr lang="en-CA" sz="1400" dirty="0">
                 <a:latin typeface="Cascadia Code"/>
               </a:rPr>
               <a:t>    </a:t>
             </a:r>
             <a:r>
-              <a:rPr sz="1400">
+              <a:rPr lang="en-CA" sz="1400" dirty="0">
                 <a:solidFill>
                   <a:srgbClr val="4070A0"/>
                 </a:solidFill>
                 <a:latin typeface="Cascadia Code"/>
               </a:rPr>
-              <a:t>'.\README.md'</a:t>
+              <a:t>'.\Presentation.md'</a:t>
             </a:r>
             <a:br>
-              <a:rPr sz="1400"/>
+              <a:rPr lang="en-CA" sz="1400" dirty="0"/>
             </a:br>
             <a:r>
-              <a:rPr sz="1400">
+              <a:rPr lang="en-CA" sz="1400" dirty="0">
                 <a:latin typeface="Cascadia Code"/>
               </a:rPr>
               <a:t>    </a:t>
             </a:r>
             <a:r>
-              <a:rPr sz="1400">
+              <a:rPr lang="en-CA" sz="1400" dirty="0">
                 <a:solidFill>
                   <a:srgbClr val="4070A0"/>
                 </a:solidFill>
@@ -6709,16 +6757,16 @@
               <a:t>'--from=markdown'</a:t>
             </a:r>
             <a:br>
-              <a:rPr sz="1400"/>
+              <a:rPr lang="en-CA" sz="1400" dirty="0"/>
             </a:br>
             <a:r>
-              <a:rPr sz="1400">
+              <a:rPr lang="en-CA" sz="1400" dirty="0">
                 <a:latin typeface="Cascadia Code"/>
               </a:rPr>
               <a:t>    </a:t>
             </a:r>
             <a:r>
-              <a:rPr sz="1400">
+              <a:rPr lang="en-CA" sz="1400" dirty="0">
                 <a:solidFill>
                   <a:srgbClr val="4070A0"/>
                 </a:solidFill>
@@ -6727,16 +6775,16 @@
               <a:t>'--to=pptx'</a:t>
             </a:r>
             <a:br>
-              <a:rPr sz="1400"/>
+              <a:rPr lang="en-CA" sz="1400" dirty="0"/>
             </a:br>
             <a:r>
-              <a:rPr sz="1400">
+              <a:rPr lang="en-CA" sz="1400" dirty="0">
                 <a:latin typeface="Cascadia Code"/>
               </a:rPr>
               <a:t>    </a:t>
             </a:r>
             <a:r>
-              <a:rPr sz="1400">
+              <a:rPr lang="en-CA" sz="1400" dirty="0">
                 <a:solidFill>
                   <a:srgbClr val="4070A0"/>
                 </a:solidFill>
@@ -6745,82 +6793,118 @@
               <a:t>'--slide-level=2'</a:t>
             </a:r>
             <a:br>
-              <a:rPr sz="1400"/>
+              <a:rPr lang="en-CA" sz="1400" dirty="0"/>
             </a:br>
             <a:r>
-              <a:rPr sz="1400">
+              <a:rPr lang="en-CA" sz="1400" dirty="0">
                 <a:latin typeface="Cascadia Code"/>
               </a:rPr>
               <a:t>    </a:t>
             </a:r>
             <a:r>
-              <a:rPr sz="1400">
+              <a:rPr lang="en-CA" sz="1400" dirty="0">
                 <a:solidFill>
                   <a:srgbClr val="4070A0"/>
                 </a:solidFill>
                 <a:latin typeface="Cascadia Code"/>
               </a:rPr>
-              <a:t>'--reference-doc=.\Presentation\custom-reference.pptx'</a:t>
+              <a:t>'--reference-doc=.\custom-reference.pptx'</a:t>
             </a:r>
             <a:br>
-              <a:rPr sz="1400"/>
+              <a:rPr lang="en-CA" sz="1400" dirty="0"/>
             </a:br>
             <a:r>
-              <a:rPr sz="1400">
+              <a:rPr lang="en-CA" sz="1400" dirty="0">
                 <a:latin typeface="Cascadia Code"/>
               </a:rPr>
               <a:t>    </a:t>
             </a:r>
             <a:r>
-              <a:rPr sz="1400">
+              <a:rPr lang="en-CA" sz="1400" dirty="0">
                 <a:solidFill>
                   <a:srgbClr val="4070A0"/>
                 </a:solidFill>
                 <a:latin typeface="Cascadia Code"/>
               </a:rPr>
-              <a:t>'--metadata-file=.\Presentation\Presentation.yaml'</a:t>
-            </a:r>
-            <a:br>
-              <a:rPr sz="1400"/>
-            </a:br>
-            <a:r>
-              <a:rPr sz="1400">
-                <a:latin typeface="Cascadia Code"/>
-              </a:rPr>
-              <a:t>    </a:t>
-            </a:r>
-            <a:r>
-              <a:rPr sz="1400">
+              <a:t>'--metadata-file=.\</a:t>
+            </a:r>
+            <a:r>
+              <a:rPr lang="en-CA" sz="1400" dirty="0" err="1">
                 <a:solidFill>
                   <a:srgbClr val="4070A0"/>
                 </a:solidFill>
                 <a:latin typeface="Cascadia Code"/>
               </a:rPr>
-              <a:t>'--variable=monofont=Cascadia Code'</a:t>
-            </a:r>
-            <a:br>
-              <a:rPr sz="1400"/>
-            </a:br>
-            <a:r>
-              <a:rPr sz="1400">
-                <a:latin typeface="Cascadia Code"/>
-              </a:rPr>
-              <a:t>    </a:t>
-            </a:r>
-            <a:r>
-              <a:rPr sz="1400">
+              <a:t>Presentation.yaml</a:t>
+            </a:r>
+            <a:r>
+              <a:rPr lang="en-CA" sz="1400" dirty="0">
                 <a:solidFill>
                   <a:srgbClr val="4070A0"/>
                 </a:solidFill>
                 <a:latin typeface="Cascadia Code"/>
               </a:rPr>
-              <a:t>'--output=.\Presentation\Presentation.pptx'</a:t>
+              <a:t>'</a:t>
             </a:r>
             <a:br>
-              <a:rPr sz="1400"/>
+              <a:rPr lang="en-CA" sz="1400" dirty="0"/>
             </a:br>
             <a:r>
-              <a:rPr sz="1400">
+              <a:rPr lang="en-CA" sz="1400" dirty="0">
+                <a:latin typeface="Cascadia Code"/>
+              </a:rPr>
+              <a:t>    </a:t>
+            </a:r>
+            <a:r>
+              <a:rPr lang="en-CA" sz="1400" dirty="0">
+                <a:solidFill>
+                  <a:srgbClr val="4070A0"/>
+                </a:solidFill>
+                <a:latin typeface="Cascadia Code"/>
+              </a:rPr>
+              <a:t>'--variable=</a:t>
+            </a:r>
+            <a:r>
+              <a:rPr lang="en-CA" sz="1400" dirty="0" err="1">
+                <a:solidFill>
+                  <a:srgbClr val="4070A0"/>
+                </a:solidFill>
+                <a:latin typeface="Cascadia Code"/>
+              </a:rPr>
+              <a:t>monofont</a:t>
+            </a:r>
+            <a:r>
+              <a:rPr lang="en-CA" sz="1400" dirty="0">
+                <a:solidFill>
+                  <a:srgbClr val="4070A0"/>
+                </a:solidFill>
+                <a:latin typeface="Cascadia Code"/>
+              </a:rPr>
+              <a:t>=Cascadia Code'</a:t>
+            </a:r>
+            <a:br>
+              <a:rPr lang="en-CA" sz="1400" dirty="0"/>
+            </a:br>
+            <a:r>
+              <a:rPr lang="en-CA" sz="1400" dirty="0">
+                <a:latin typeface="Cascadia Code"/>
+              </a:rPr>
+              <a:t>    </a:t>
+            </a:r>
+            <a:r>
+              <a:rPr lang="en-CA" sz="1400" dirty="0">
+                <a:solidFill>
+                  <a:srgbClr val="4070A0"/>
+                </a:solidFill>
+                <a:latin typeface="Cascadia Code"/>
+              </a:rPr>
+              <a:t>'--output=.\Presentation.pptx'</a:t>
+            </a:r>
+            <a:br>
+              <a:rPr lang="en-CA" sz="1400" dirty="0"/>
+            </a:br>
+            <a:r>
+              <a:rPr lang="en-CA" sz="1400" dirty="0">
                 <a:solidFill>
                   <a:srgbClr val="666666"/>
                 </a:solidFill>

</xml_diff>